<commit_message>
adding new EDITE progress report 2013/2014
</commit_message>
<xml_diff>
--- a/Progress Reports CIFRE & Workplans/PhD Interim Report/Architecture Diagram.pptx
+++ b/Progress Reports CIFRE & Workplans/PhD Interim Report/Architecture Diagram.pptx
@@ -288,9 +288,9 @@
           <a:p>
             <a:fld id="{27DCA558-2BB8-41E0-8BD0-BAB9873548F3}" type="datetimeFigureOut">
               <a:rPr lang="en-US" smtClean="0"/>
-              <a:t>8/28/2014</a:t>
+              <a:t>9/8/2014</a:t>
             </a:fld>
-            <a:endParaRPr lang="en-US"/>
+            <a:endParaRPr lang="en-US" dirty="0"/>
           </a:p>
         </p:txBody>
       </p:sp>
@@ -309,7 +309,7 @@
           <a:bodyPr/>
           <a:lstStyle/>
           <a:p>
-            <a:endParaRPr lang="en-US"/>
+            <a:endParaRPr lang="en-US" dirty="0"/>
           </a:p>
         </p:txBody>
       </p:sp>
@@ -332,7 +332,7 @@
               <a:rPr lang="en-US" smtClean="0"/>
               <a:t>‹#›</a:t>
             </a:fld>
-            <a:endParaRPr lang="en-US"/>
+            <a:endParaRPr lang="en-US" dirty="0"/>
           </a:p>
         </p:txBody>
       </p:sp>
@@ -458,9 +458,9 @@
           <a:p>
             <a:fld id="{27DCA558-2BB8-41E0-8BD0-BAB9873548F3}" type="datetimeFigureOut">
               <a:rPr lang="en-US" smtClean="0"/>
-              <a:t>8/28/2014</a:t>
+              <a:t>9/8/2014</a:t>
             </a:fld>
-            <a:endParaRPr lang="en-US"/>
+            <a:endParaRPr lang="en-US" dirty="0"/>
           </a:p>
         </p:txBody>
       </p:sp>
@@ -479,7 +479,7 @@
           <a:bodyPr/>
           <a:lstStyle/>
           <a:p>
-            <a:endParaRPr lang="en-US"/>
+            <a:endParaRPr lang="en-US" dirty="0"/>
           </a:p>
         </p:txBody>
       </p:sp>
@@ -502,7 +502,7 @@
               <a:rPr lang="en-US" smtClean="0"/>
               <a:t>‹#›</a:t>
             </a:fld>
-            <a:endParaRPr lang="en-US"/>
+            <a:endParaRPr lang="en-US" dirty="0"/>
           </a:p>
         </p:txBody>
       </p:sp>
@@ -638,9 +638,9 @@
           <a:p>
             <a:fld id="{27DCA558-2BB8-41E0-8BD0-BAB9873548F3}" type="datetimeFigureOut">
               <a:rPr lang="en-US" smtClean="0"/>
-              <a:t>8/28/2014</a:t>
+              <a:t>9/8/2014</a:t>
             </a:fld>
-            <a:endParaRPr lang="en-US"/>
+            <a:endParaRPr lang="en-US" dirty="0"/>
           </a:p>
         </p:txBody>
       </p:sp>
@@ -659,7 +659,7 @@
           <a:bodyPr/>
           <a:lstStyle/>
           <a:p>
-            <a:endParaRPr lang="en-US"/>
+            <a:endParaRPr lang="en-US" dirty="0"/>
           </a:p>
         </p:txBody>
       </p:sp>
@@ -682,7 +682,7 @@
               <a:rPr lang="en-US" smtClean="0"/>
               <a:t>‹#›</a:t>
             </a:fld>
-            <a:endParaRPr lang="en-US"/>
+            <a:endParaRPr lang="en-US" dirty="0"/>
           </a:p>
         </p:txBody>
       </p:sp>
@@ -808,9 +808,9 @@
           <a:p>
             <a:fld id="{27DCA558-2BB8-41E0-8BD0-BAB9873548F3}" type="datetimeFigureOut">
               <a:rPr lang="en-US" smtClean="0"/>
-              <a:t>8/28/2014</a:t>
+              <a:t>9/8/2014</a:t>
             </a:fld>
-            <a:endParaRPr lang="en-US"/>
+            <a:endParaRPr lang="en-US" dirty="0"/>
           </a:p>
         </p:txBody>
       </p:sp>
@@ -829,7 +829,7 @@
           <a:bodyPr/>
           <a:lstStyle/>
           <a:p>
-            <a:endParaRPr lang="en-US"/>
+            <a:endParaRPr lang="en-US" dirty="0"/>
           </a:p>
         </p:txBody>
       </p:sp>
@@ -852,7 +852,7 @@
               <a:rPr lang="en-US" smtClean="0"/>
               <a:t>‹#›</a:t>
             </a:fld>
-            <a:endParaRPr lang="en-US"/>
+            <a:endParaRPr lang="en-US" dirty="0"/>
           </a:p>
         </p:txBody>
       </p:sp>
@@ -1054,9 +1054,9 @@
           <a:p>
             <a:fld id="{27DCA558-2BB8-41E0-8BD0-BAB9873548F3}" type="datetimeFigureOut">
               <a:rPr lang="en-US" smtClean="0"/>
-              <a:t>8/28/2014</a:t>
+              <a:t>9/8/2014</a:t>
             </a:fld>
-            <a:endParaRPr lang="en-US"/>
+            <a:endParaRPr lang="en-US" dirty="0"/>
           </a:p>
         </p:txBody>
       </p:sp>
@@ -1075,7 +1075,7 @@
           <a:bodyPr/>
           <a:lstStyle/>
           <a:p>
-            <a:endParaRPr lang="en-US"/>
+            <a:endParaRPr lang="en-US" dirty="0"/>
           </a:p>
         </p:txBody>
       </p:sp>
@@ -1098,7 +1098,7 @@
               <a:rPr lang="en-US" smtClean="0"/>
               <a:t>‹#›</a:t>
             </a:fld>
-            <a:endParaRPr lang="en-US"/>
+            <a:endParaRPr lang="en-US" dirty="0"/>
           </a:p>
         </p:txBody>
       </p:sp>
@@ -1342,9 +1342,9 @@
           <a:p>
             <a:fld id="{27DCA558-2BB8-41E0-8BD0-BAB9873548F3}" type="datetimeFigureOut">
               <a:rPr lang="en-US" smtClean="0"/>
-              <a:t>8/28/2014</a:t>
+              <a:t>9/8/2014</a:t>
             </a:fld>
-            <a:endParaRPr lang="en-US"/>
+            <a:endParaRPr lang="en-US" dirty="0"/>
           </a:p>
         </p:txBody>
       </p:sp>
@@ -1363,7 +1363,7 @@
           <a:bodyPr/>
           <a:lstStyle/>
           <a:p>
-            <a:endParaRPr lang="en-US"/>
+            <a:endParaRPr lang="en-US" dirty="0"/>
           </a:p>
         </p:txBody>
       </p:sp>
@@ -1386,7 +1386,7 @@
               <a:rPr lang="en-US" smtClean="0"/>
               <a:t>‹#›</a:t>
             </a:fld>
-            <a:endParaRPr lang="en-US"/>
+            <a:endParaRPr lang="en-US" dirty="0"/>
           </a:p>
         </p:txBody>
       </p:sp>
@@ -1764,9 +1764,9 @@
           <a:p>
             <a:fld id="{27DCA558-2BB8-41E0-8BD0-BAB9873548F3}" type="datetimeFigureOut">
               <a:rPr lang="en-US" smtClean="0"/>
-              <a:t>8/28/2014</a:t>
+              <a:t>9/8/2014</a:t>
             </a:fld>
-            <a:endParaRPr lang="en-US"/>
+            <a:endParaRPr lang="en-US" dirty="0"/>
           </a:p>
         </p:txBody>
       </p:sp>
@@ -1785,7 +1785,7 @@
           <a:bodyPr/>
           <a:lstStyle/>
           <a:p>
-            <a:endParaRPr lang="en-US"/>
+            <a:endParaRPr lang="en-US" dirty="0"/>
           </a:p>
         </p:txBody>
       </p:sp>
@@ -1808,7 +1808,7 @@
               <a:rPr lang="en-US" smtClean="0"/>
               <a:t>‹#›</a:t>
             </a:fld>
-            <a:endParaRPr lang="en-US"/>
+            <a:endParaRPr lang="en-US" dirty="0"/>
           </a:p>
         </p:txBody>
       </p:sp>
@@ -1882,9 +1882,9 @@
           <a:p>
             <a:fld id="{27DCA558-2BB8-41E0-8BD0-BAB9873548F3}" type="datetimeFigureOut">
               <a:rPr lang="en-US" smtClean="0"/>
-              <a:t>8/28/2014</a:t>
+              <a:t>9/8/2014</a:t>
             </a:fld>
-            <a:endParaRPr lang="en-US"/>
+            <a:endParaRPr lang="en-US" dirty="0"/>
           </a:p>
         </p:txBody>
       </p:sp>
@@ -1903,7 +1903,7 @@
           <a:bodyPr/>
           <a:lstStyle/>
           <a:p>
-            <a:endParaRPr lang="en-US"/>
+            <a:endParaRPr lang="en-US" dirty="0"/>
           </a:p>
         </p:txBody>
       </p:sp>
@@ -1926,7 +1926,7 @@
               <a:rPr lang="en-US" smtClean="0"/>
               <a:t>‹#›</a:t>
             </a:fld>
-            <a:endParaRPr lang="en-US"/>
+            <a:endParaRPr lang="en-US" dirty="0"/>
           </a:p>
         </p:txBody>
       </p:sp>
@@ -1977,9 +1977,9 @@
           <a:p>
             <a:fld id="{27DCA558-2BB8-41E0-8BD0-BAB9873548F3}" type="datetimeFigureOut">
               <a:rPr lang="en-US" smtClean="0"/>
-              <a:t>8/28/2014</a:t>
+              <a:t>9/8/2014</a:t>
             </a:fld>
-            <a:endParaRPr lang="en-US"/>
+            <a:endParaRPr lang="en-US" dirty="0"/>
           </a:p>
         </p:txBody>
       </p:sp>
@@ -1998,7 +1998,7 @@
           <a:bodyPr/>
           <a:lstStyle/>
           <a:p>
-            <a:endParaRPr lang="en-US"/>
+            <a:endParaRPr lang="en-US" dirty="0"/>
           </a:p>
         </p:txBody>
       </p:sp>
@@ -2021,7 +2021,7 @@
               <a:rPr lang="en-US" smtClean="0"/>
               <a:t>‹#›</a:t>
             </a:fld>
-            <a:endParaRPr lang="en-US"/>
+            <a:endParaRPr lang="en-US" dirty="0"/>
           </a:p>
         </p:txBody>
       </p:sp>
@@ -2254,9 +2254,9 @@
           <a:p>
             <a:fld id="{27DCA558-2BB8-41E0-8BD0-BAB9873548F3}" type="datetimeFigureOut">
               <a:rPr lang="en-US" smtClean="0"/>
-              <a:t>8/28/2014</a:t>
+              <a:t>9/8/2014</a:t>
             </a:fld>
-            <a:endParaRPr lang="en-US"/>
+            <a:endParaRPr lang="en-US" dirty="0"/>
           </a:p>
         </p:txBody>
       </p:sp>
@@ -2275,7 +2275,7 @@
           <a:bodyPr/>
           <a:lstStyle/>
           <a:p>
-            <a:endParaRPr lang="en-US"/>
+            <a:endParaRPr lang="en-US" dirty="0"/>
           </a:p>
         </p:txBody>
       </p:sp>
@@ -2298,7 +2298,7 @@
               <a:rPr lang="en-US" smtClean="0"/>
               <a:t>‹#›</a:t>
             </a:fld>
-            <a:endParaRPr lang="en-US"/>
+            <a:endParaRPr lang="en-US" dirty="0"/>
           </a:p>
         </p:txBody>
       </p:sp>
@@ -2421,7 +2421,7 @@
             </a:lvl9pPr>
           </a:lstStyle>
           <a:p>
-            <a:endParaRPr lang="en-US"/>
+            <a:endParaRPr lang="en-US" dirty="0"/>
           </a:p>
         </p:txBody>
       </p:sp>
@@ -2507,9 +2507,9 @@
           <a:p>
             <a:fld id="{27DCA558-2BB8-41E0-8BD0-BAB9873548F3}" type="datetimeFigureOut">
               <a:rPr lang="en-US" smtClean="0"/>
-              <a:t>8/28/2014</a:t>
+              <a:t>9/8/2014</a:t>
             </a:fld>
-            <a:endParaRPr lang="en-US"/>
+            <a:endParaRPr lang="en-US" dirty="0"/>
           </a:p>
         </p:txBody>
       </p:sp>
@@ -2528,7 +2528,7 @@
           <a:bodyPr/>
           <a:lstStyle/>
           <a:p>
-            <a:endParaRPr lang="en-US"/>
+            <a:endParaRPr lang="en-US" dirty="0"/>
           </a:p>
         </p:txBody>
       </p:sp>
@@ -2551,7 +2551,7 @@
               <a:rPr lang="en-US" smtClean="0"/>
               <a:t>‹#›</a:t>
             </a:fld>
-            <a:endParaRPr lang="en-US"/>
+            <a:endParaRPr lang="en-US" dirty="0"/>
           </a:p>
         </p:txBody>
       </p:sp>
@@ -2720,9 +2720,9 @@
           <a:p>
             <a:fld id="{27DCA558-2BB8-41E0-8BD0-BAB9873548F3}" type="datetimeFigureOut">
               <a:rPr lang="en-US" smtClean="0"/>
-              <a:t>8/28/2014</a:t>
+              <a:t>9/8/2014</a:t>
             </a:fld>
-            <a:endParaRPr lang="en-US"/>
+            <a:endParaRPr lang="en-US" dirty="0"/>
           </a:p>
         </p:txBody>
       </p:sp>
@@ -2759,7 +2759,7 @@
             </a:lvl1pPr>
           </a:lstStyle>
           <a:p>
-            <a:endParaRPr lang="en-US"/>
+            <a:endParaRPr lang="en-US" dirty="0"/>
           </a:p>
         </p:txBody>
       </p:sp>
@@ -2800,7 +2800,7 @@
               <a:rPr lang="en-US" smtClean="0"/>
               <a:t>‹#›</a:t>
             </a:fld>
-            <a:endParaRPr lang="en-US"/>
+            <a:endParaRPr lang="en-US" dirty="0"/>
           </a:p>
         </p:txBody>
       </p:sp>
@@ -3467,7 +3467,7 @@
                 <a:t>Alchemy API, </a:t>
               </a:r>
               <a:r>
-                <a:rPr lang="en-US" sz="700" dirty="0" err="1" smtClean="0"/>
+                <a:rPr lang="en-US" sz="700" dirty="0" smtClean="0"/>
                 <a:t>Semantria</a:t>
               </a:r>
               <a:endParaRPr lang="en-US" sz="700" dirty="0"/>
@@ -3482,9 +3482,9 @@
           </p:nvGrpSpPr>
           <p:grpSpPr>
             <a:xfrm>
-              <a:off x="853068" y="2755550"/>
+              <a:off x="853068" y="2758744"/>
               <a:ext cx="1440366" cy="537959"/>
-              <a:chOff x="2979234" y="1153660"/>
+              <a:chOff x="2979234" y="1156854"/>
               <a:chExt cx="1440366" cy="537959"/>
             </a:xfrm>
           </p:grpSpPr>
@@ -3496,46 +3496,12 @@
             </p:nvGrpSpPr>
             <p:grpSpPr>
               <a:xfrm>
-                <a:off x="2979234" y="1153660"/>
+                <a:off x="2979234" y="1156854"/>
                 <a:ext cx="1440366" cy="537959"/>
-                <a:chOff x="3124200" y="1900441"/>
+                <a:chOff x="3124200" y="1905279"/>
                 <a:chExt cx="1440366" cy="814887"/>
               </a:xfrm>
             </p:grpSpPr>
-            <p:sp>
-              <p:nvSpPr>
-                <p:cNvPr id="20" name="TextBox 19"/>
-                <p:cNvSpPr txBox="1"/>
-                <p:nvPr/>
-              </p:nvSpPr>
-              <p:spPr>
-                <a:xfrm>
-                  <a:off x="3124200" y="1915582"/>
-                  <a:ext cx="1440366" cy="200055"/>
-                </a:xfrm>
-                <a:prstGeom prst="rect">
-                  <a:avLst/>
-                </a:prstGeom>
-                <a:noFill/>
-                <a:ln>
-                  <a:noFill/>
-                </a:ln>
-              </p:spPr>
-              <p:txBody>
-                <a:bodyPr wrap="square" rtlCol="0">
-                  <a:spAutoFit/>
-                </a:bodyPr>
-                <a:lstStyle/>
-                <a:p>
-                  <a:pPr algn="ctr"/>
-                  <a:r>
-                    <a:rPr lang="en-US" sz="700" dirty="0" smtClean="0"/>
-                    <a:t>SEED</a:t>
-                  </a:r>
-                  <a:endParaRPr lang="en-US" sz="700" dirty="0"/>
-                </a:p>
-              </p:txBody>
-            </p:sp>
             <p:sp>
               <p:nvSpPr>
                 <p:cNvPr id="21" name="Rectangle 20"/>
@@ -3544,16 +3510,14 @@
               </p:nvSpPr>
               <p:spPr>
                 <a:xfrm>
-                  <a:off x="3124200" y="1900441"/>
+                  <a:off x="3124200" y="1905279"/>
                   <a:ext cx="1440366" cy="814887"/>
                 </a:xfrm>
                 <a:prstGeom prst="rect">
                   <a:avLst/>
                 </a:prstGeom>
                 <a:solidFill>
-                  <a:srgbClr val="000000">
-                    <a:alpha val="23922"/>
-                  </a:srgbClr>
+                  <a:srgbClr val="000000"/>
                 </a:solidFill>
                 <a:ln w="9525">
                   <a:solidFill>
@@ -3582,7 +3546,53 @@
                 <a:lstStyle/>
                 <a:p>
                   <a:pPr algn="ctr"/>
-                  <a:endParaRPr lang="en-US"/>
+                  <a:endParaRPr lang="en-US" dirty="0">
+                    <a:solidFill>
+                      <a:schemeClr val="bg1"/>
+                    </a:solidFill>
+                  </a:endParaRPr>
+                </a:p>
+              </p:txBody>
+            </p:sp>
+            <p:sp>
+              <p:nvSpPr>
+                <p:cNvPr id="20" name="TextBox 19"/>
+                <p:cNvSpPr txBox="1"/>
+                <p:nvPr/>
+              </p:nvSpPr>
+              <p:spPr>
+                <a:xfrm>
+                  <a:off x="3124200" y="1915582"/>
+                  <a:ext cx="1440366" cy="303038"/>
+                </a:xfrm>
+                <a:prstGeom prst="rect">
+                  <a:avLst/>
+                </a:prstGeom>
+                <a:noFill/>
+                <a:ln>
+                  <a:noFill/>
+                </a:ln>
+              </p:spPr>
+              <p:txBody>
+                <a:bodyPr wrap="square" rtlCol="0">
+                  <a:spAutoFit/>
+                </a:bodyPr>
+                <a:lstStyle/>
+                <a:p>
+                  <a:pPr algn="ctr"/>
+                  <a:r>
+                    <a:rPr lang="en-US" sz="700" dirty="0" smtClean="0">
+                      <a:solidFill>
+                        <a:schemeClr val="bg1"/>
+                      </a:solidFill>
+                    </a:rPr>
+                    <a:t>SEED</a:t>
+                  </a:r>
+                  <a:endParaRPr lang="en-US" sz="700" dirty="0">
+                    <a:solidFill>
+                      <a:schemeClr val="bg1"/>
+                    </a:solidFill>
+                  </a:endParaRPr>
                 </a:p>
               </p:txBody>
             </p:sp>
@@ -3618,7 +3628,7 @@
               <a:p>
                 <a:pPr algn="ctr"/>
                 <a:r>
-                  <a:rPr lang="en-US" sz="700" dirty="0" err="1" smtClean="0"/>
+                  <a:rPr lang="en-US" sz="700" dirty="0" smtClean="0"/>
                   <a:t>DBpedia</a:t>
                 </a:r>
                 <a:endParaRPr lang="en-US" sz="700" dirty="0"/>
@@ -3697,7 +3707,7 @@
             <a:p>
               <a:pPr algn="ctr"/>
               <a:r>
-                <a:rPr lang="en-US" sz="700" dirty="0" err="1" smtClean="0"/>
+                <a:rPr lang="en-US" sz="700" dirty="0" smtClean="0"/>
                 <a:t>Kanopy</a:t>
               </a:r>
               <a:endParaRPr lang="en-US" sz="700" dirty="0"/>
@@ -3871,7 +3881,7 @@
             <a:p>
               <a:pPr algn="ctr"/>
               <a:r>
-                <a:rPr lang="en-US" sz="700" dirty="0" err="1" smtClean="0"/>
+                <a:rPr lang="en-US" sz="700" dirty="0" smtClean="0"/>
                 <a:t>DyLDO</a:t>
               </a:r>
               <a:endParaRPr lang="en-US" sz="700" dirty="0"/>
@@ -4060,7 +4070,9 @@
               <a:avLst/>
             </a:prstGeom>
             <a:solidFill>
-              <a:srgbClr val="FFC000"/>
+              <a:srgbClr val="00B050">
+                <a:alpha val="80000"/>
+              </a:srgbClr>
             </a:solidFill>
             <a:ln>
               <a:solidFill>
@@ -4152,7 +4164,7 @@
             <a:p>
               <a:pPr algn="ctr"/>
               <a:r>
-                <a:rPr lang="en-US" sz="700" dirty="0" err="1" smtClean="0"/>
+                <a:rPr lang="en-US" sz="700" dirty="0" smtClean="0"/>
                 <a:t>VoID</a:t>
               </a:r>
               <a:endParaRPr lang="en-US" sz="700" dirty="0"/>

</xml_diff>